<commit_message>
final Review 1 ppt
</commit_message>
<xml_diff>
--- a/FYP 2019 - 2020_review1.pptx
+++ b/FYP 2019 - 2020_review1.pptx
@@ -17,6 +17,8 @@
     <p:sldId id="286" r:id="rId11"/>
     <p:sldId id="281" r:id="rId12"/>
     <p:sldId id="280" r:id="rId13"/>
+    <p:sldId id="287" r:id="rId14"/>
+    <p:sldId id="288" r:id="rId15"/>
   </p:sldIdLst>
   <p:sldSz cx="9144000" cy="6858000" type="screen4x3"/>
   <p:notesSz cx="6858000" cy="9144000"/>
@@ -300,7 +302,7 @@
             <a:fld id="{5C065831-CC3D-43FD-BC43-2D0C3A8EE4B2}" type="datetimeFigureOut">
               <a:rPr lang="en-IN" smtClean="0"/>
               <a:pPr/>
-              <a:t>17-12-2019</a:t>
+              <a:t>18-12-2019</a:t>
             </a:fld>
             <a:endParaRPr lang="en-IN"/>
           </a:p>
@@ -467,7 +469,7 @@
             <a:fld id="{5C065831-CC3D-43FD-BC43-2D0C3A8EE4B2}" type="datetimeFigureOut">
               <a:rPr lang="en-IN" smtClean="0"/>
               <a:pPr/>
-              <a:t>17-12-2019</a:t>
+              <a:t>18-12-2019</a:t>
             </a:fld>
             <a:endParaRPr lang="en-IN"/>
           </a:p>
@@ -644,7 +646,7 @@
             <a:fld id="{5C065831-CC3D-43FD-BC43-2D0C3A8EE4B2}" type="datetimeFigureOut">
               <a:rPr lang="en-IN" smtClean="0"/>
               <a:pPr/>
-              <a:t>17-12-2019</a:t>
+              <a:t>18-12-2019</a:t>
             </a:fld>
             <a:endParaRPr lang="en-IN"/>
           </a:p>
@@ -811,7 +813,7 @@
             <a:fld id="{5C065831-CC3D-43FD-BC43-2D0C3A8EE4B2}" type="datetimeFigureOut">
               <a:rPr lang="en-IN" smtClean="0"/>
               <a:pPr/>
-              <a:t>17-12-2019</a:t>
+              <a:t>18-12-2019</a:t>
             </a:fld>
             <a:endParaRPr lang="en-IN"/>
           </a:p>
@@ -1054,7 +1056,7 @@
             <a:fld id="{5C065831-CC3D-43FD-BC43-2D0C3A8EE4B2}" type="datetimeFigureOut">
               <a:rPr lang="en-IN" smtClean="0"/>
               <a:pPr/>
-              <a:t>17-12-2019</a:t>
+              <a:t>18-12-2019</a:t>
             </a:fld>
             <a:endParaRPr lang="en-IN"/>
           </a:p>
@@ -1339,7 +1341,7 @@
             <a:fld id="{5C065831-CC3D-43FD-BC43-2D0C3A8EE4B2}" type="datetimeFigureOut">
               <a:rPr lang="en-IN" smtClean="0"/>
               <a:pPr/>
-              <a:t>17-12-2019</a:t>
+              <a:t>18-12-2019</a:t>
             </a:fld>
             <a:endParaRPr lang="en-IN"/>
           </a:p>
@@ -1758,7 +1760,7 @@
             <a:fld id="{5C065831-CC3D-43FD-BC43-2D0C3A8EE4B2}" type="datetimeFigureOut">
               <a:rPr lang="en-IN" smtClean="0"/>
               <a:pPr/>
-              <a:t>17-12-2019</a:t>
+              <a:t>18-12-2019</a:t>
             </a:fld>
             <a:endParaRPr lang="en-IN"/>
           </a:p>
@@ -1873,7 +1875,7 @@
             <a:fld id="{5C065831-CC3D-43FD-BC43-2D0C3A8EE4B2}" type="datetimeFigureOut">
               <a:rPr lang="en-IN" smtClean="0"/>
               <a:pPr/>
-              <a:t>17-12-2019</a:t>
+              <a:t>18-12-2019</a:t>
             </a:fld>
             <a:endParaRPr lang="en-IN"/>
           </a:p>
@@ -1965,7 +1967,7 @@
             <a:fld id="{5C065831-CC3D-43FD-BC43-2D0C3A8EE4B2}" type="datetimeFigureOut">
               <a:rPr lang="en-IN" smtClean="0"/>
               <a:pPr/>
-              <a:t>17-12-2019</a:t>
+              <a:t>18-12-2019</a:t>
             </a:fld>
             <a:endParaRPr lang="en-IN"/>
           </a:p>
@@ -2239,7 +2241,7 @@
             <a:fld id="{5C065831-CC3D-43FD-BC43-2D0C3A8EE4B2}" type="datetimeFigureOut">
               <a:rPr lang="en-IN" smtClean="0"/>
               <a:pPr/>
-              <a:t>17-12-2019</a:t>
+              <a:t>18-12-2019</a:t>
             </a:fld>
             <a:endParaRPr lang="en-IN"/>
           </a:p>
@@ -2489,7 +2491,7 @@
             <a:fld id="{5C065831-CC3D-43FD-BC43-2D0C3A8EE4B2}" type="datetimeFigureOut">
               <a:rPr lang="en-IN" smtClean="0"/>
               <a:pPr/>
-              <a:t>17-12-2019</a:t>
+              <a:t>18-12-2019</a:t>
             </a:fld>
             <a:endParaRPr lang="en-IN"/>
           </a:p>
@@ -2699,7 +2701,7 @@
             <a:fld id="{5C065831-CC3D-43FD-BC43-2D0C3A8EE4B2}" type="datetimeFigureOut">
               <a:rPr lang="en-IN" smtClean="0"/>
               <a:pPr/>
-              <a:t>17-12-2019</a:t>
+              <a:t>18-12-2019</a:t>
             </a:fld>
             <a:endParaRPr lang="en-IN"/>
           </a:p>
@@ -3375,11 +3377,7 @@
             </a:pPr>
             <a:r>
               <a:rPr lang="en-US" dirty="0" smtClean="0"/>
-              <a:t>Web development</a:t>
-            </a:r>
-            <a:r>
-              <a:rPr lang="en-US" dirty="0" smtClean="0"/>
-              <a:t>:</a:t>
+              <a:t>Web development:</a:t>
             </a:r>
           </a:p>
           <a:p>
@@ -3464,8 +3462,8 @@
         </p:blipFill>
         <p:spPr bwMode="auto">
           <a:xfrm>
-            <a:off x="681037" y="1743869"/>
-            <a:ext cx="7781925" cy="4238625"/>
+            <a:off x="323529" y="1743869"/>
+            <a:ext cx="8739472" cy="4760177"/>
           </a:xfrm>
           <a:prstGeom prst="rect">
             <a:avLst/>
@@ -3550,6 +3548,508 @@
           </a:xfrm>
         </p:spPr>
       </p:pic>
+    </p:spTree>
+  </p:cSld>
+  <p:clrMapOvr>
+    <a:masterClrMapping/>
+  </p:clrMapOvr>
+</p:sld>
+</file>
+
+<file path=ppt/slides/slide13.xml><?xml version="1.0" encoding="utf-8"?>
+<p:sld xmlns:a="http://schemas.openxmlformats.org/drawingml/2006/main" xmlns:r="http://schemas.openxmlformats.org/officeDocument/2006/relationships" xmlns:p="http://schemas.openxmlformats.org/presentationml/2006/main">
+  <p:cSld>
+    <p:spTree>
+      <p:nvGrpSpPr>
+        <p:cNvPr id="1" name=""/>
+        <p:cNvGrpSpPr/>
+        <p:nvPr/>
+      </p:nvGrpSpPr>
+      <p:grpSpPr>
+        <a:xfrm>
+          <a:off x="0" y="0"/>
+          <a:ext cx="0" cy="0"/>
+          <a:chOff x="0" y="0"/>
+          <a:chExt cx="0" cy="0"/>
+        </a:xfrm>
+      </p:grpSpPr>
+      <p:sp>
+        <p:nvSpPr>
+          <p:cNvPr id="2" name="Title 1"/>
+          <p:cNvSpPr>
+            <a:spLocks noGrp="1"/>
+          </p:cNvSpPr>
+          <p:nvPr>
+            <p:ph type="title"/>
+          </p:nvPr>
+        </p:nvSpPr>
+        <p:spPr>
+          <a:xfrm>
+            <a:off x="467544" y="0"/>
+            <a:ext cx="8229600" cy="778098"/>
+          </a:xfrm>
+        </p:spPr>
+        <p:txBody>
+          <a:bodyPr/>
+          <a:lstStyle/>
+          <a:p>
+            <a:r>
+              <a:rPr lang="en-IN" dirty="0" smtClean="0"/>
+              <a:t>REFERENCES</a:t>
+            </a:r>
+            <a:endParaRPr lang="en-IN" dirty="0"/>
+          </a:p>
+        </p:txBody>
+      </p:sp>
+      <p:sp>
+        <p:nvSpPr>
+          <p:cNvPr id="3" name="Content Placeholder 2"/>
+          <p:cNvSpPr>
+            <a:spLocks noGrp="1"/>
+          </p:cNvSpPr>
+          <p:nvPr>
+            <p:ph idx="1"/>
+          </p:nvPr>
+        </p:nvSpPr>
+        <p:spPr>
+          <a:xfrm>
+            <a:off x="457200" y="1268760"/>
+            <a:ext cx="8229600" cy="5589240"/>
+          </a:xfrm>
+        </p:spPr>
+        <p:txBody>
+          <a:bodyPr>
+            <a:normAutofit fontScale="92500" lnSpcReduction="10000"/>
+          </a:bodyPr>
+          <a:lstStyle/>
+          <a:p>
+            <a:pPr marL="457200" indent="-457200" fontAlgn="t">
+              <a:buNone/>
+            </a:pPr>
+            <a:r>
+              <a:rPr lang="en-IN" sz="2000" dirty="0" smtClean="0"/>
+              <a:t>[1] 	Sam </a:t>
+            </a:r>
+            <a:r>
+              <a:rPr lang="en-IN" sz="2000" dirty="0" err="1" smtClean="0"/>
+              <a:t>Maes</a:t>
+            </a:r>
+            <a:r>
+              <a:rPr lang="en-IN" sz="2000" dirty="0" smtClean="0"/>
+              <a:t>, Karl </a:t>
+            </a:r>
+            <a:r>
+              <a:rPr lang="en-IN" sz="2000" dirty="0" err="1" smtClean="0"/>
+              <a:t>Tuyls</a:t>
+            </a:r>
+            <a:r>
+              <a:rPr lang="en-IN" sz="2000" dirty="0" smtClean="0"/>
+              <a:t> and Bram </a:t>
+            </a:r>
+            <a:r>
+              <a:rPr lang="en-IN" sz="2000" dirty="0" err="1" smtClean="0"/>
+              <a:t>Vanschoenwinkel</a:t>
+            </a:r>
+            <a:r>
+              <a:rPr lang="en-IN" sz="2000" dirty="0" smtClean="0"/>
+              <a:t>, “Credit card fraud detection using Bayesian and neural networks”, Source: </a:t>
+            </a:r>
+            <a:r>
+              <a:rPr lang="en-IN" sz="2000" dirty="0" err="1" smtClean="0"/>
+              <a:t>CiteSeer</a:t>
+            </a:r>
+            <a:r>
+              <a:rPr lang="en-IN" sz="2000" dirty="0" smtClean="0"/>
+              <a:t> 2002, Available  online:                                                                                                                                                                                                 </a:t>
+            </a:r>
+            <a:r>
+              <a:rPr lang="en-IN" sz="2000" dirty="0" smtClean="0">
+                <a:hlinkClick r:id="rId2"/>
+              </a:rPr>
+              <a:t>https://www.researchgate.net/publication/2524707_Credit_Card_Fraud_Detection_Using_Bayesian_and_Neural_Networks</a:t>
+            </a:r>
+            <a:r>
+              <a:rPr lang="en-IN" sz="2000" dirty="0" smtClean="0"/>
+              <a:t>.</a:t>
+            </a:r>
+          </a:p>
+          <a:p>
+            <a:pPr marL="457200" indent="-457200" fontAlgn="t">
+              <a:buNone/>
+            </a:pPr>
+            <a:endParaRPr lang="en-IN" sz="2000" dirty="0" smtClean="0"/>
+          </a:p>
+          <a:p>
+            <a:pPr marL="457200" indent="-457200" fontAlgn="t">
+              <a:buNone/>
+            </a:pPr>
+            <a:r>
+              <a:rPr lang="en-IN" sz="2000" dirty="0" smtClean="0"/>
+              <a:t>[2]	</a:t>
+            </a:r>
+            <a:r>
+              <a:rPr lang="en-IN" sz="2000" dirty="0" err="1" smtClean="0"/>
+              <a:t>Carcillo</a:t>
+            </a:r>
+            <a:r>
+              <a:rPr lang="en-IN" sz="2000" dirty="0" smtClean="0"/>
+              <a:t> </a:t>
+            </a:r>
+            <a:r>
+              <a:rPr lang="en-IN" sz="2000" dirty="0" err="1" smtClean="0"/>
+              <a:t>Fabrizio</a:t>
+            </a:r>
+            <a:r>
+              <a:rPr lang="en-IN" sz="2000" dirty="0" smtClean="0"/>
+              <a:t>, Le </a:t>
+            </a:r>
+            <a:r>
+              <a:rPr lang="en-IN" sz="2000" dirty="0" err="1" smtClean="0"/>
+              <a:t>Borgne</a:t>
+            </a:r>
+            <a:r>
+              <a:rPr lang="en-IN" sz="2000" dirty="0" smtClean="0"/>
+              <a:t> </a:t>
+            </a:r>
+            <a:r>
+              <a:rPr lang="en-IN" sz="2000" dirty="0" err="1" smtClean="0"/>
+              <a:t>Yann-Aël</a:t>
+            </a:r>
+            <a:r>
+              <a:rPr lang="en-IN" sz="2000" dirty="0" smtClean="0"/>
+              <a:t>, </a:t>
+            </a:r>
+            <a:r>
+              <a:rPr lang="en-IN" sz="2000" dirty="0" err="1" smtClean="0"/>
+              <a:t>Caelen</a:t>
+            </a:r>
+            <a:r>
+              <a:rPr lang="en-IN" sz="2000" dirty="0" smtClean="0"/>
+              <a:t> Olivier and </a:t>
+            </a:r>
+            <a:r>
+              <a:rPr lang="en-IN" sz="2000" dirty="0" err="1" smtClean="0"/>
+              <a:t>Bontempi</a:t>
+            </a:r>
+            <a:r>
+              <a:rPr lang="en-IN" sz="2000" dirty="0" smtClean="0"/>
+              <a:t> </a:t>
+            </a:r>
+            <a:r>
+              <a:rPr lang="en-IN" sz="2000" dirty="0" err="1" smtClean="0"/>
+              <a:t>Gianluca</a:t>
+            </a:r>
+            <a:r>
+              <a:rPr lang="en-IN" sz="2000" b="1" dirty="0" smtClean="0"/>
+              <a:t> </a:t>
+            </a:r>
+            <a:r>
+              <a:rPr lang="en-IN" sz="2000" dirty="0" smtClean="0"/>
+              <a:t>“Streaming active learning strategies for real-life credit card fraud detection: assessment and visualization”, International Journal of Data Science and Analytics, </a:t>
+            </a:r>
+            <a:r>
+              <a:rPr lang="en-US" sz="2000" dirty="0" smtClean="0"/>
+              <a:t>Springer  2018.</a:t>
+            </a:r>
+          </a:p>
+          <a:p>
+            <a:pPr marL="457200" indent="-457200" fontAlgn="t">
+              <a:buNone/>
+            </a:pPr>
+            <a:endParaRPr lang="en-US" sz="2000" dirty="0" smtClean="0"/>
+          </a:p>
+          <a:p>
+            <a:pPr marL="457200" indent="-457200" fontAlgn="t">
+              <a:buNone/>
+            </a:pPr>
+            <a:r>
+              <a:rPr lang="en-IN" sz="2000" dirty="0" smtClean="0"/>
+              <a:t>[3]	</a:t>
+            </a:r>
+            <a:r>
+              <a:rPr lang="en-IN" sz="2000" dirty="0" err="1" smtClean="0"/>
+              <a:t>Dal</a:t>
+            </a:r>
+            <a:r>
+              <a:rPr lang="en-IN" sz="2000" dirty="0" smtClean="0"/>
+              <a:t> </a:t>
+            </a:r>
+            <a:r>
+              <a:rPr lang="en-IN" sz="2000" dirty="0" err="1" smtClean="0"/>
+              <a:t>Pozzolo</a:t>
+            </a:r>
+            <a:r>
+              <a:rPr lang="en-IN" sz="2000" dirty="0" smtClean="0"/>
+              <a:t> Andrea, ”0Adaptive Machine learning for credit card fraud detection”, ULB MLG PhD thesis  2016.</a:t>
+            </a:r>
+          </a:p>
+          <a:p>
+            <a:pPr marL="457200" indent="-457200" fontAlgn="t">
+              <a:buNone/>
+            </a:pPr>
+            <a:endParaRPr lang="en-IN" sz="2000" dirty="0" smtClean="0"/>
+          </a:p>
+          <a:p>
+            <a:pPr marL="457200" indent="-457200" fontAlgn="t">
+              <a:buNone/>
+            </a:pPr>
+            <a:r>
+              <a:rPr lang="en-IN" sz="2000" dirty="0" smtClean="0"/>
+              <a:t>[4]	Rafael Pierre, “Detecting Financial Fraud Using Machine Learning”, 2018, Available online: </a:t>
+            </a:r>
+            <a:r>
+              <a:rPr lang="en-IN" sz="2000" dirty="0" smtClean="0">
+                <a:hlinkClick r:id="rId3"/>
+              </a:rPr>
+              <a:t>https://towardsdatascience.com/detecting-financial-fraud-using-machine-learning-three-ways-of-winning-the-war-against-imbalanced-a03f8815cce9</a:t>
+            </a:r>
+            <a:endParaRPr lang="en-IN" sz="2000" dirty="0" smtClean="0"/>
+          </a:p>
+          <a:p>
+            <a:pPr fontAlgn="t"/>
+            <a:endParaRPr lang="en-IN" sz="2000" dirty="0" smtClean="0"/>
+          </a:p>
+          <a:p>
+            <a:pPr fontAlgn="t"/>
+            <a:endParaRPr lang="en-IN" sz="2000" b="1" dirty="0" smtClean="0"/>
+          </a:p>
+          <a:p>
+            <a:pPr fontAlgn="t"/>
+            <a:endParaRPr lang="en-US" sz="2000" dirty="0" smtClean="0"/>
+          </a:p>
+          <a:p>
+            <a:pPr fontAlgn="t"/>
+            <a:endParaRPr lang="en-IN" sz="2000" dirty="0" smtClean="0"/>
+          </a:p>
+          <a:p>
+            <a:pPr fontAlgn="t"/>
+            <a:endParaRPr lang="en-IN" sz="2000" b="1" dirty="0" smtClean="0"/>
+          </a:p>
+          <a:p>
+            <a:pPr fontAlgn="t"/>
+            <a:endParaRPr lang="en-IN" sz="2000" dirty="0" smtClean="0"/>
+          </a:p>
+          <a:p>
+            <a:pPr fontAlgn="t"/>
+            <a:endParaRPr lang="en-IN" sz="2000" dirty="0" smtClean="0"/>
+          </a:p>
+          <a:p>
+            <a:pPr fontAlgn="t"/>
+            <a:endParaRPr lang="en-IN" b="1" dirty="0" smtClean="0"/>
+          </a:p>
+          <a:p>
+            <a:endParaRPr lang="en-IN" dirty="0"/>
+          </a:p>
+        </p:txBody>
+      </p:sp>
+    </p:spTree>
+  </p:cSld>
+  <p:clrMapOvr>
+    <a:masterClrMapping/>
+  </p:clrMapOvr>
+</p:sld>
+</file>
+
+<file path=ppt/slides/slide14.xml><?xml version="1.0" encoding="utf-8"?>
+<p:sld xmlns:a="http://schemas.openxmlformats.org/drawingml/2006/main" xmlns:r="http://schemas.openxmlformats.org/officeDocument/2006/relationships" xmlns:p="http://schemas.openxmlformats.org/presentationml/2006/main">
+  <p:cSld>
+    <p:spTree>
+      <p:nvGrpSpPr>
+        <p:cNvPr id="1" name=""/>
+        <p:cNvGrpSpPr/>
+        <p:nvPr/>
+      </p:nvGrpSpPr>
+      <p:grpSpPr>
+        <a:xfrm>
+          <a:off x="0" y="0"/>
+          <a:ext cx="0" cy="0"/>
+          <a:chOff x="0" y="0"/>
+          <a:chExt cx="0" cy="0"/>
+        </a:xfrm>
+      </p:grpSpPr>
+      <p:sp>
+        <p:nvSpPr>
+          <p:cNvPr id="3" name="Content Placeholder 2"/>
+          <p:cNvSpPr>
+            <a:spLocks noGrp="1"/>
+          </p:cNvSpPr>
+          <p:nvPr>
+            <p:ph idx="1"/>
+          </p:nvPr>
+        </p:nvSpPr>
+        <p:spPr>
+          <a:xfrm>
+            <a:off x="457200" y="260648"/>
+            <a:ext cx="8229600" cy="5865515"/>
+          </a:xfrm>
+        </p:spPr>
+        <p:txBody>
+          <a:bodyPr>
+            <a:normAutofit lnSpcReduction="10000"/>
+          </a:bodyPr>
+          <a:lstStyle/>
+          <a:p>
+            <a:pPr marL="457200" indent="-457200" fontAlgn="base">
+              <a:buNone/>
+            </a:pPr>
+            <a:r>
+              <a:rPr lang="en-IN" sz="2000" dirty="0" smtClean="0"/>
+              <a:t>[5]	Machine learning group ULB, “Credit Card Fraud Detection: </a:t>
+            </a:r>
+            <a:r>
+              <a:rPr lang="en-IN" sz="2000" dirty="0" err="1" smtClean="0"/>
+              <a:t>Anonymized</a:t>
+            </a:r>
+            <a:r>
+              <a:rPr lang="en-IN" sz="2000" dirty="0" smtClean="0"/>
+              <a:t> credit card transactions </a:t>
+            </a:r>
+            <a:r>
+              <a:rPr lang="en-IN" sz="2000" dirty="0" err="1" smtClean="0"/>
+              <a:t>labeled</a:t>
+            </a:r>
+            <a:r>
+              <a:rPr lang="en-IN" sz="2000" dirty="0" smtClean="0"/>
+              <a:t> as fraudulent or genuine”, 2017,       Source: </a:t>
+            </a:r>
+            <a:r>
+              <a:rPr lang="en-IN" sz="2000" dirty="0" err="1" smtClean="0"/>
+              <a:t>Kaggle</a:t>
+            </a:r>
+            <a:r>
+              <a:rPr lang="en-IN" sz="2000" dirty="0" smtClean="0"/>
+              <a:t>, Available online: </a:t>
+            </a:r>
+            <a:r>
+              <a:rPr lang="en-IN" sz="2000" dirty="0" smtClean="0">
+                <a:hlinkClick r:id="rId2"/>
+              </a:rPr>
+              <a:t>https://www.kaggle.com/mlg-ulb/creditcardfraud</a:t>
+            </a:r>
+            <a:endParaRPr lang="en-IN" sz="2000" dirty="0" smtClean="0"/>
+          </a:p>
+          <a:p>
+            <a:pPr marL="457200" indent="-457200" fontAlgn="base">
+              <a:buNone/>
+            </a:pPr>
+            <a:endParaRPr lang="en-IN" sz="2000" dirty="0" smtClean="0"/>
+          </a:p>
+          <a:p>
+            <a:pPr marL="457200" indent="-457200" fontAlgn="base">
+              <a:buNone/>
+            </a:pPr>
+            <a:r>
+              <a:rPr lang="en-IN" sz="2000" dirty="0" smtClean="0"/>
+              <a:t>[6]	Kevin McCarty, “Fraud Detection using Python”, Python Articles 2018, Available online: </a:t>
+            </a:r>
+            <a:r>
+              <a:rPr lang="en-IN" sz="2000" dirty="0" smtClean="0">
+                <a:hlinkClick r:id="rId3"/>
+              </a:rPr>
+              <a:t>https://www.accelebrate.com/blog/fraud-detection-using-python</a:t>
+            </a:r>
+            <a:endParaRPr lang="en-IN" sz="2000" dirty="0" smtClean="0"/>
+          </a:p>
+          <a:p>
+            <a:pPr marL="457200" indent="-457200" fontAlgn="base">
+              <a:buNone/>
+            </a:pPr>
+            <a:endParaRPr lang="en-IN" sz="2000" dirty="0" smtClean="0"/>
+          </a:p>
+          <a:p>
+            <a:pPr marL="457200" indent="-457200" fontAlgn="base">
+              <a:buNone/>
+            </a:pPr>
+            <a:r>
+              <a:rPr lang="en-IN" sz="2000" dirty="0" smtClean="0"/>
+              <a:t>[7]	</a:t>
+            </a:r>
+            <a:r>
+              <a:rPr lang="en-IN" sz="2000" dirty="0" err="1" smtClean="0"/>
+              <a:t>Navoneel</a:t>
+            </a:r>
+            <a:r>
+              <a:rPr lang="en-IN" sz="2000" dirty="0" smtClean="0"/>
+              <a:t> </a:t>
+            </a:r>
+            <a:r>
+              <a:rPr lang="en-IN" sz="2000" dirty="0" err="1" smtClean="0"/>
+              <a:t>Chakrabarty</a:t>
+            </a:r>
+            <a:r>
+              <a:rPr lang="en-IN" sz="2000" dirty="0" smtClean="0"/>
+              <a:t>, “Application of Synthetic Minority Over-sampling Technique (SMOTE) for Imbalanced Datasets”, 2019, Available online: </a:t>
+            </a:r>
+            <a:r>
+              <a:rPr lang="en-IN" sz="2000" dirty="0" smtClean="0">
+                <a:hlinkClick r:id="rId4"/>
+              </a:rPr>
+              <a:t>https://medium.com/towards-artificial-intelligence</a:t>
+            </a:r>
+            <a:r>
+              <a:rPr lang="en-IN" sz="2000" dirty="0" smtClean="0"/>
+              <a:t>.</a:t>
+            </a:r>
+          </a:p>
+          <a:p>
+            <a:pPr marL="457200" indent="-457200" fontAlgn="base">
+              <a:buNone/>
+            </a:pPr>
+            <a:endParaRPr lang="en-IN" sz="2000" dirty="0" smtClean="0"/>
+          </a:p>
+          <a:p>
+            <a:pPr marL="457200" indent="-457200" fontAlgn="base">
+              <a:buNone/>
+            </a:pPr>
+            <a:r>
+              <a:rPr lang="en-IN" sz="2000" dirty="0" smtClean="0"/>
+              <a:t>[8]	“Oversampling and </a:t>
+            </a:r>
+            <a:r>
+              <a:rPr lang="en-IN" sz="2000" dirty="0" err="1" smtClean="0"/>
+              <a:t>undersampling</a:t>
+            </a:r>
+            <a:r>
+              <a:rPr lang="en-IN" sz="2000" dirty="0" smtClean="0"/>
+              <a:t> in data analysis”, Source: </a:t>
+            </a:r>
+            <a:r>
+              <a:rPr lang="en-IN" sz="2000" dirty="0" err="1" smtClean="0"/>
+              <a:t>Wikipaedia</a:t>
+            </a:r>
+            <a:r>
+              <a:rPr lang="en-IN" sz="2000" dirty="0" smtClean="0"/>
+              <a:t>, Available Online: </a:t>
+            </a:r>
+            <a:r>
+              <a:rPr lang="en-IN" sz="2000" dirty="0" smtClean="0">
+                <a:hlinkClick r:id="rId5"/>
+              </a:rPr>
+              <a:t>https://en.wikipedia.org/wiki/Oversampling_and_undersampling_in_dataanalysis</a:t>
+            </a:r>
+            <a:endParaRPr lang="en-IN" sz="2000" dirty="0" smtClean="0"/>
+          </a:p>
+          <a:p>
+            <a:pPr fontAlgn="base">
+              <a:buNone/>
+            </a:pPr>
+            <a:r>
+              <a:rPr lang="en-IN" sz="2000" dirty="0" smtClean="0"/>
+              <a:t/>
+            </a:r>
+            <a:br>
+              <a:rPr lang="en-IN" sz="2000" dirty="0" smtClean="0"/>
+            </a:br>
+            <a:endParaRPr lang="en-IN" sz="2000" dirty="0" smtClean="0"/>
+          </a:p>
+          <a:p>
+            <a:pPr>
+              <a:buNone/>
+            </a:pPr>
+            <a:endParaRPr lang="en-IN" sz="2000" dirty="0"/>
+          </a:p>
+        </p:txBody>
+      </p:sp>
     </p:spTree>
   </p:cSld>
   <p:clrMapOvr>
@@ -3942,7 +4442,7 @@
           <a:p>
             <a:r>
               <a:rPr lang="en-IN" sz="3000" dirty="0" smtClean="0"/>
-              <a:t>Analysis of the statistical models.</a:t>
+              <a:t>Analysis of different statistical and machine learning models.</a:t>
             </a:r>
             <a:endParaRPr lang="en-IN" sz="3000" dirty="0"/>
           </a:p>
@@ -4065,7 +4565,7 @@
                     <a:p>
                       <a:r>
                         <a:rPr lang="en-IN" dirty="0" smtClean="0"/>
-                        <a:t>PUBLICATON</a:t>
+                        <a:t>SOURCE</a:t>
                       </a:r>
                       <a:endParaRPr lang="en-IN" dirty="0"/>
                     </a:p>
@@ -4142,6 +4642,14 @@
                     <a:bodyPr/>
                     <a:lstStyle/>
                     <a:p>
+                      <a:r>
+                        <a:rPr lang="en-IN" dirty="0" err="1" smtClean="0"/>
+                        <a:t>CiteSeer</a:t>
+                      </a:r>
+                      <a:r>
+                        <a:rPr lang="en-IN" dirty="0" smtClean="0"/>
+                        <a:t> 2002</a:t>
+                      </a:r>
                       <a:endParaRPr lang="en-IN" dirty="0"/>
                     </a:p>
                   </a:txBody>
@@ -4692,7 +5200,7 @@
           </p:nvPr>
         </p:nvGraphicFramePr>
         <p:xfrm>
-          <a:off x="0" y="476250"/>
+          <a:off x="0" y="30450"/>
           <a:ext cx="9108504" cy="6827550"/>
         </p:xfrm>
         <a:graphic>
@@ -4743,7 +5251,7 @@
                     <a:p>
                       <a:r>
                         <a:rPr lang="en-IN" dirty="0" smtClean="0"/>
-                        <a:t>PUBLICATON</a:t>
+                        <a:t>SOURCE</a:t>
                       </a:r>
                       <a:endParaRPr lang="en-IN" dirty="0"/>
                     </a:p>
@@ -5473,7 +5981,7 @@
                     <a:p>
                       <a:r>
                         <a:rPr lang="en-IN" dirty="0" smtClean="0"/>
-                        <a:t>PUBLICATON</a:t>
+                        <a:t>SOURCE</a:t>
                       </a:r>
                       <a:endParaRPr lang="en-IN" dirty="0"/>
                     </a:p>

</xml_diff>